<commit_message>
Update for base data
</commit_message>
<xml_diff>
--- a/OtherDocs/UF_BaseData.pptx
+++ b/OtherDocs/UF_BaseData.pptx
@@ -11858,32 +11858,45 @@
           <a:p>
             <a:r>
               <a:rPr lang="en-US" dirty="0" smtClean="0"/>
-              <a:t>Upload via ftp</a:t>
-            </a:r>
-          </a:p>
-          <a:p>
+              <a:t>Load into a staging database (</a:t>
+            </a:r>
+            <a:r>
+              <a:rPr lang="en-US" dirty="0" err="1" smtClean="0"/>
+              <a:t>PostGIS</a:t>
+            </a:r>
             <a:r>
               <a:rPr lang="en-US" dirty="0" smtClean="0"/>
-              <a:t>Create new geographic area in </a:t>
+              <a:t>)</a:t>
+            </a:r>
+          </a:p>
+          <a:p>
+            <a:r>
+              <a:rPr lang="en-US" dirty="0" smtClean="0"/>
+              <a:t>Upload </a:t>
+            </a:r>
+            <a:r>
+              <a:rPr lang="en-US" dirty="0" smtClean="0"/>
+              <a:t>via </a:t>
+            </a:r>
+            <a:r>
+              <a:rPr lang="en-US" dirty="0" smtClean="0"/>
+              <a:t>ftp (see installation instructions)</a:t>
+            </a:r>
+          </a:p>
+          <a:p>
+            <a:r>
+              <a:rPr lang="en-US" dirty="0" smtClean="0"/>
+              <a:t>Build into </a:t>
             </a:r>
             <a:r>
               <a:rPr lang="en-US" dirty="0" err="1" smtClean="0"/>
-              <a:t>Django</a:t>
+              <a:t>UrbanFootprint</a:t>
+            </a:r>
+            <a:r>
+              <a:rPr lang="en-US" dirty="0" smtClean="0"/>
+              <a:t> (see installation instructions)</a:t>
             </a:r>
             <a:endParaRPr lang="en-US" dirty="0" smtClean="0"/>
-          </a:p>
-          <a:p>
-            <a:r>
-              <a:rPr lang="en-US" dirty="0" smtClean="0"/>
-              <a:t>Create new schema in database</a:t>
-            </a:r>
-          </a:p>
-          <a:p>
-            <a:r>
-              <a:rPr lang="en-US" dirty="0" smtClean="0"/>
-              <a:t>Load data to schema</a:t>
-            </a:r>
-            <a:endParaRPr lang="en-US" dirty="0"/>
           </a:p>
         </p:txBody>
       </p:sp>

</xml_diff>